<commit_message>
Minor modifications to the project plan
</commit_message>
<xml_diff>
--- a/Power point files/Project plan report.pptx
+++ b/Power point files/Project plan report.pptx
@@ -216,7 +216,7 @@
           <a:p>
             <a:fld id="{3C11D06C-D5DE-814D-931E-02A0CE659BAA}" type="datetimeFigureOut">
               <a:rPr lang="fi-FI" smtClean="0"/>
-              <a:t>9.2.2021</a:t>
+              <a:t>10.2.2021</a:t>
             </a:fld>
             <a:endParaRPr lang="fi-FI"/>
           </a:p>
@@ -393,7 +393,7 @@
           <a:p>
             <a:fld id="{5CE9BFB5-475C-5B44-BA4D-42DE8089864D}" type="datetimeFigureOut">
               <a:rPr lang="fi-FI" smtClean="0"/>
-              <a:t>9.2.2021</a:t>
+              <a:t>10.2.2021</a:t>
             </a:fld>
             <a:endParaRPr lang="fi-FI"/>
           </a:p>
@@ -947,7 +947,7 @@
           <a:p>
             <a:fld id="{46F494B7-536B-4523-A93B-014DDA635166}" type="datetime1">
               <a:rPr lang="en-GB" noProof="0" smtClean="0"/>
-              <a:t>09/02/2021</a:t>
+              <a:t>10/02/2021</a:t>
             </a:fld>
             <a:endParaRPr lang="en-GB" noProof="0"/>
           </a:p>
@@ -1259,7 +1259,7 @@
           <a:p>
             <a:fld id="{E49F6CDD-3D96-4E59-90E6-D27F0B55FBA1}" type="datetime1">
               <a:rPr lang="en-GB" noProof="0" smtClean="0"/>
-              <a:t>09/02/2021</a:t>
+              <a:t>10/02/2021</a:t>
             </a:fld>
             <a:endParaRPr lang="en-GB" noProof="0"/>
           </a:p>
@@ -1396,7 +1396,7 @@
           <a:p>
             <a:fld id="{CF43835C-B417-41EC-B18F-FE0259E07427}" type="datetime1">
               <a:rPr lang="en-GB" noProof="0" smtClean="0"/>
-              <a:t>09/02/2021</a:t>
+              <a:t>10/02/2021</a:t>
             </a:fld>
             <a:endParaRPr lang="en-GB" noProof="0"/>
           </a:p>
@@ -1794,7 +1794,7 @@
           <a:p>
             <a:fld id="{2AA00BC7-E6BD-409E-AC0A-D889FBBF3E1F}" type="datetime1">
               <a:rPr lang="en-GB" noProof="0" smtClean="0"/>
-              <a:t>09/02/2021</a:t>
+              <a:t>10/02/2021</a:t>
             </a:fld>
             <a:endParaRPr lang="en-GB" noProof="0"/>
           </a:p>
@@ -1993,7 +1993,7 @@
           <a:p>
             <a:fld id="{79F7EF30-58D9-49C5-94D1-8B67946A371B}" type="datetime1">
               <a:rPr lang="en-GB" noProof="0" smtClean="0"/>
-              <a:t>09/02/2021</a:t>
+              <a:t>10/02/2021</a:t>
             </a:fld>
             <a:endParaRPr lang="en-GB" noProof="0"/>
           </a:p>
@@ -2356,7 +2356,7 @@
           <a:p>
             <a:fld id="{9A4C26E0-BC88-47C0-AD7A-A430FED46C56}" type="datetime1">
               <a:rPr lang="en-GB" noProof="0" smtClean="0"/>
-              <a:t>09/02/2021</a:t>
+              <a:t>10/02/2021</a:t>
             </a:fld>
             <a:endParaRPr lang="en-GB" noProof="0"/>
           </a:p>
@@ -2847,7 +2847,7 @@
           <a:p>
             <a:fld id="{F4E85C38-12AF-4A65-9090-146927E09118}" type="datetime1">
               <a:rPr lang="en-GB" noProof="0" smtClean="0"/>
-              <a:t>09/02/2021</a:t>
+              <a:t>10/02/2021</a:t>
             </a:fld>
             <a:endParaRPr lang="en-GB" noProof="0"/>
           </a:p>
@@ -3072,7 +3072,7 @@
           <a:p>
             <a:fld id="{2AD8DA1C-8DF2-40CF-A6C6-9495D045055C}" type="datetime1">
               <a:rPr lang="en-GB" noProof="0" smtClean="0"/>
-              <a:t>09/02/2021</a:t>
+              <a:t>10/02/2021</a:t>
             </a:fld>
             <a:endParaRPr lang="en-GB" noProof="0"/>
           </a:p>
@@ -3477,7 +3477,7 @@
           <a:p>
             <a:fld id="{FA1142E9-37CE-4F05-A30E-024093FAE7FE}" type="datetime1">
               <a:rPr lang="en-GB" noProof="0" smtClean="0"/>
-              <a:t>09/02/2021</a:t>
+              <a:t>10/02/2021</a:t>
             </a:fld>
             <a:endParaRPr lang="en-GB" noProof="0"/>
           </a:p>
@@ -3702,7 +3702,7 @@
           <a:p>
             <a:fld id="{BA4F5F4A-6670-4A3D-BA5D-CF8F09F6A2E1}" type="datetime1">
               <a:rPr lang="en-GB" noProof="0" smtClean="0"/>
-              <a:t>09/02/2021</a:t>
+              <a:t>10/02/2021</a:t>
             </a:fld>
             <a:endParaRPr lang="en-GB" noProof="0"/>
           </a:p>
@@ -4089,7 +4089,7 @@
           <a:p>
             <a:fld id="{FA6CB48B-6017-439D-AA22-D52A1E8E03DF}" type="datetime1">
               <a:rPr lang="en-GB" noProof="0" smtClean="0"/>
-              <a:t>09/02/2021</a:t>
+              <a:t>10/02/2021</a:t>
             </a:fld>
             <a:endParaRPr lang="en-GB" noProof="0"/>
           </a:p>
@@ -4485,7 +4485,7 @@
           <a:p>
             <a:fld id="{43E7B4C2-9CD6-4CF3-963A-B0F7A6D52886}" type="datetime1">
               <a:rPr lang="en-GB" noProof="0" smtClean="0"/>
-              <a:t>09/02/2021</a:t>
+              <a:t>10/02/2021</a:t>
             </a:fld>
             <a:endParaRPr lang="en-GB" noProof="0"/>
           </a:p>
@@ -4793,7 +4793,7 @@
           <a:p>
             <a:fld id="{1EE6AC87-9CEE-4DB8-8548-B22705DD2657}" type="datetime1">
               <a:rPr lang="en-GB" noProof="0" smtClean="0"/>
-              <a:t>09/02/2021</a:t>
+              <a:t>10/02/2021</a:t>
             </a:fld>
             <a:endParaRPr lang="en-GB" noProof="0"/>
           </a:p>
@@ -5249,7 +5249,7 @@
           <a:p>
             <a:fld id="{9D03F41F-2DF9-4314-B419-CB3131364AA1}" type="datetime1">
               <a:rPr lang="en-GB" noProof="0" smtClean="0"/>
-              <a:t>09/02/2021</a:t>
+              <a:t>10/02/2021</a:t>
             </a:fld>
             <a:endParaRPr lang="en-GB" noProof="0"/>
           </a:p>
@@ -5523,7 +5523,7 @@
           <a:p>
             <a:fld id="{A586C00E-9402-4F7D-8E29-ACD9F4C25B61}" type="datetime1">
               <a:rPr lang="en-GB" noProof="0" smtClean="0"/>
-              <a:t>09/02/2021</a:t>
+              <a:t>10/02/2021</a:t>
             </a:fld>
             <a:endParaRPr lang="en-GB" noProof="0"/>
           </a:p>
@@ -5933,7 +5933,7 @@
           <a:p>
             <a:fld id="{DD093AD3-EDC3-4310-A3F5-847AF7FE82B9}" type="datetime1">
               <a:rPr lang="en-GB" noProof="0" smtClean="0"/>
-              <a:t>09/02/2021</a:t>
+              <a:t>10/02/2021</a:t>
             </a:fld>
             <a:endParaRPr lang="en-GB" noProof="0"/>
           </a:p>
@@ -6250,7 +6250,7 @@
           <a:p>
             <a:fld id="{1AFFCF40-801B-4055-982B-AEEA190E0F59}" type="datetime1">
               <a:rPr lang="en-GB" noProof="0" smtClean="0"/>
-              <a:t>09/02/2021</a:t>
+              <a:t>10/02/2021</a:t>
             </a:fld>
             <a:endParaRPr lang="en-GB" noProof="0"/>
           </a:p>
@@ -6703,7 +6703,7 @@
           <a:p>
             <a:fld id="{99D4FE21-5C27-4278-912B-A716F3E94A20}" type="datetime1">
               <a:rPr lang="en-GB" noProof="0" smtClean="0"/>
-              <a:t>09/02/2021</a:t>
+              <a:t>10/02/2021</a:t>
             </a:fld>
             <a:endParaRPr lang="en-GB" noProof="0"/>
           </a:p>
@@ -7457,7 +7457,7 @@
           <a:p>
             <a:fld id="{64EDD59F-3A17-4BC6-9E83-53686DFA9C26}" type="datetime1">
               <a:rPr lang="en-GB" noProof="0" smtClean="0"/>
-              <a:t>09/02/2021</a:t>
+              <a:t>10/02/2021</a:t>
             </a:fld>
             <a:endParaRPr lang="en-GB" noProof="0"/>
           </a:p>
@@ -8086,7 +8086,7 @@
           <a:p>
             <a:fld id="{C03CCED2-7CB5-4D58-8E64-3F32DD8AC35B}" type="datetime1">
               <a:rPr lang="en-GB" noProof="0" smtClean="0"/>
-              <a:t>09/02/2021</a:t>
+              <a:t>10/02/2021</a:t>
             </a:fld>
             <a:endParaRPr lang="en-GB" noProof="0"/>
           </a:p>
@@ -8371,7 +8371,7 @@
           <a:p>
             <a:fld id="{05B95343-439D-47C2-AB7D-A7B7FEDBEAB3}" type="datetime1">
               <a:rPr lang="en-GB" noProof="0" smtClean="0"/>
-              <a:t>09/02/2021</a:t>
+              <a:t>10/02/2021</a:t>
             </a:fld>
             <a:endParaRPr lang="en-GB" noProof="0"/>
           </a:p>
@@ -8698,7 +8698,7 @@
           <a:p>
             <a:fld id="{DFF24113-B408-42F9-B448-C515AD4E1B6E}" type="datetime1">
               <a:rPr lang="en-GB" noProof="0" smtClean="0"/>
-              <a:t>09/02/2021</a:t>
+              <a:t>10/02/2021</a:t>
             </a:fld>
             <a:endParaRPr lang="en-GB" noProof="0"/>
           </a:p>
@@ -9081,7 +9081,7 @@
           <a:p>
             <a:fld id="{E469B13D-3954-4F23-A09B-162115E21D05}" type="datetime1">
               <a:rPr lang="en-GB" noProof="0" smtClean="0"/>
-              <a:t>09/02/2021</a:t>
+              <a:t>10/02/2021</a:t>
             </a:fld>
             <a:endParaRPr lang="en-GB" noProof="0"/>
           </a:p>
@@ -9794,7 +9794,7 @@
           <a:p>
             <a:fld id="{FE98C067-8722-48C5-8452-DDEDD7114E73}" type="datetime1">
               <a:rPr lang="en-GB" noProof="0" smtClean="0"/>
-              <a:t>09/02/2021</a:t>
+              <a:t>10/02/2021</a:t>
             </a:fld>
             <a:endParaRPr lang="en-GB" noProof="0" dirty="0"/>
           </a:p>
@@ -10008,7 +10008,7 @@
           <a:p>
             <a:fld id="{6FA188AA-A794-4652-BE5A-909F08B6167B}" type="datetime1">
               <a:rPr lang="en-GB" noProof="0" smtClean="0"/>
-              <a:t>09/02/2021</a:t>
+              <a:t>10/02/2021</a:t>
             </a:fld>
             <a:endParaRPr lang="en-GB" noProof="0"/>
           </a:p>
@@ -10537,7 +10537,7 @@
           <a:p>
             <a:fld id="{19B791B1-16A9-4796-ABE1-3107E5C870A1}" type="datetime1">
               <a:rPr lang="en-GB" noProof="0" smtClean="0"/>
-              <a:t>09/02/2021</a:t>
+              <a:t>10/02/2021</a:t>
             </a:fld>
             <a:endParaRPr lang="en-GB" noProof="0"/>
           </a:p>
@@ -10899,7 +10899,7 @@
           <a:p>
             <a:fld id="{077F78B7-30BA-47DC-8D3D-B6AF7AA5C106}" type="datetime1">
               <a:rPr lang="en-GB" noProof="0" smtClean="0"/>
-              <a:t>09/02/2021</a:t>
+              <a:t>10/02/2021</a:t>
             </a:fld>
             <a:endParaRPr lang="en-GB" noProof="0"/>
           </a:p>
@@ -11224,7 +11224,7 @@
           <a:p>
             <a:fld id="{7A384A62-AD18-48D9-B88A-A3C8BA3326D3}" type="datetime1">
               <a:rPr lang="en-GB" noProof="0" smtClean="0"/>
-              <a:t>09/02/2021</a:t>
+              <a:t>10/02/2021</a:t>
             </a:fld>
             <a:endParaRPr lang="en-GB" noProof="0"/>
           </a:p>
@@ -11679,7 +11679,7 @@
           <a:p>
             <a:fld id="{B93D2B77-21B4-4503-8F96-67D29A8E98C1}" type="datetime1">
               <a:rPr lang="en-GB" noProof="0" smtClean="0"/>
-              <a:t>09/02/2021</a:t>
+              <a:t>10/02/2021</a:t>
             </a:fld>
             <a:endParaRPr lang="en-GB" noProof="0"/>
           </a:p>
@@ -12166,7 +12166,7 @@
           <a:p>
             <a:fld id="{7B41531B-607C-47F8-B3A9-9457FE35A658}" type="datetime1">
               <a:rPr lang="en-GB" noProof="0" smtClean="0"/>
-              <a:t>09/02/2021</a:t>
+              <a:t>10/02/2021</a:t>
             </a:fld>
             <a:endParaRPr lang="en-GB" noProof="0"/>
           </a:p>
@@ -12769,7 +12769,7 @@
           <a:p>
             <a:fld id="{2B82FCDA-E02D-49C5-97D6-3E67AC7AAA7E}" type="datetime1">
               <a:rPr lang="en-GB" noProof="0" smtClean="0"/>
-              <a:t>09/02/2021</a:t>
+              <a:t>10/02/2021</a:t>
             </a:fld>
             <a:endParaRPr lang="en-GB" noProof="0"/>
           </a:p>
@@ -12966,7 +12966,7 @@
           <a:p>
             <a:fld id="{78524CAB-73A3-4E1C-B819-63001E3C8AC4}" type="datetime1">
               <a:rPr lang="en-GB" noProof="0" smtClean="0"/>
-              <a:t>09/02/2021</a:t>
+              <a:t>10/02/2021</a:t>
             </a:fld>
             <a:endParaRPr lang="en-GB" noProof="0"/>
           </a:p>
@@ -14267,21 +14267,16 @@
             </a:pPr>
             <a:r>
               <a:rPr lang="tr-TR" b="1" dirty="0"/>
-              <a:t> </a:t>
-            </a:r>
-            <a:r>
-              <a:rPr lang="tr-TR" b="1" dirty="0" err="1"/>
-              <a:t>Advance</a:t>
+              <a:t> Advance</a:t>
+            </a:r>
+            <a:r>
+              <a:rPr lang="fi-FI" b="1" dirty="0"/>
+              <a:t>d</a:t>
             </a:r>
             <a:r>
               <a:rPr lang="tr-TR" b="1" dirty="0"/>
-              <a:t> </a:t>
-            </a:r>
-            <a:r>
-              <a:rPr lang="tr-TR" b="1" dirty="0" err="1"/>
-              <a:t>Goals</a:t>
-            </a:r>
-            <a:endParaRPr lang="tr-TR" b="1" dirty="0"/>
+              <a:t> Goals</a:t>
+            </a:r>
           </a:p>
           <a:p>
             <a:pPr marL="314325" lvl="1" indent="0">
@@ -15912,7 +15907,7 @@
               <a:buChar char="Ø"/>
             </a:pPr>
             <a:r>
-              <a:rPr lang="tr-TR" dirty="0" err="1">
+              <a:rPr lang="tr-TR" dirty="0">
                 <a:solidFill>
                   <a:srgbClr val="212529"/>
                 </a:solidFill>
@@ -15921,29 +15916,23 @@
               <a:t>Advance</a:t>
             </a:r>
             <a:r>
+              <a:rPr lang="fi-FI" dirty="0">
+                <a:solidFill>
+                  <a:srgbClr val="212529"/>
+                </a:solidFill>
+                <a:latin typeface="-apple-system"/>
+              </a:rPr>
+              <a:t>d</a:t>
+            </a:r>
+            <a:r>
               <a:rPr lang="tr-TR" dirty="0">
                 <a:solidFill>
                   <a:srgbClr val="212529"/>
                 </a:solidFill>
                 <a:latin typeface="-apple-system"/>
               </a:rPr>
-              <a:t> </a:t>
-            </a:r>
-            <a:r>
-              <a:rPr lang="tr-TR" dirty="0" err="1">
-                <a:solidFill>
-                  <a:srgbClr val="212529"/>
-                </a:solidFill>
-                <a:latin typeface="-apple-system"/>
-              </a:rPr>
-              <a:t>Goals</a:t>
-            </a:r>
-            <a:endParaRPr lang="tr-TR" dirty="0">
-              <a:solidFill>
-                <a:srgbClr val="212529"/>
-              </a:solidFill>
-              <a:latin typeface="-apple-system"/>
-            </a:endParaRPr>
+              <a:t> Goals</a:t>
+            </a:r>
           </a:p>
           <a:p>
             <a:pPr lvl="1">

</xml_diff>

<commit_message>
client hours explanation added
</commit_message>
<xml_diff>
--- a/Power point files/Project plan report.pptx
+++ b/Power point files/Project plan report.pptx
@@ -16507,23 +16507,7 @@
             </a:r>
             <a:r>
               <a:rPr lang="fi-FI" dirty="0"/>
-              <a:t>: 1h per </a:t>
-            </a:r>
-            <a:r>
-              <a:rPr lang="fi-FI" dirty="0" err="1"/>
-              <a:t>week</a:t>
-            </a:r>
-            <a:r>
-              <a:rPr lang="fi-FI" dirty="0"/>
-              <a:t>, 28h </a:t>
-            </a:r>
-            <a:r>
-              <a:rPr lang="fi-FI" dirty="0" err="1"/>
-              <a:t>hours</a:t>
-            </a:r>
-            <a:r>
-              <a:rPr lang="fi-FI" dirty="0"/>
-              <a:t> in </a:t>
+              <a:t>: 2*1*14h = 28h in </a:t>
             </a:r>
             <a:r>
               <a:rPr lang="fi-FI" dirty="0" err="1"/>

</xml_diff>

<commit_message>
projec plan presentation final
</commit_message>
<xml_diff>
--- a/Power point files/Project plan report.pptx
+++ b/Power point files/Project plan report.pptx
@@ -230,7 +230,7 @@
           <a:p>
             <a:fld id="{3C11D06C-D5DE-814D-931E-02A0CE659BAA}" type="datetimeFigureOut">
               <a:rPr lang="fi-FI" smtClean="0"/>
-              <a:t>11.2.2021</a:t>
+              <a:t>12.2.2021</a:t>
             </a:fld>
             <a:endParaRPr lang="fi-FI"/>
           </a:p>
@@ -407,7 +407,7 @@
           <a:p>
             <a:fld id="{5CE9BFB5-475C-5B44-BA4D-42DE8089864D}" type="datetimeFigureOut">
               <a:rPr lang="fi-FI" smtClean="0"/>
-              <a:t>11.2.2021</a:t>
+              <a:t>12.2.2021</a:t>
             </a:fld>
             <a:endParaRPr lang="fi-FI"/>
           </a:p>
@@ -961,7 +961,7 @@
           <a:p>
             <a:fld id="{46F494B7-536B-4523-A93B-014DDA635166}" type="datetime1">
               <a:rPr lang="en-GB" noProof="0" smtClean="0"/>
-              <a:t>11/02/2021</a:t>
+              <a:t>12/02/2021</a:t>
             </a:fld>
             <a:endParaRPr lang="en-GB" noProof="0"/>
           </a:p>
@@ -1273,7 +1273,7 @@
           <a:p>
             <a:fld id="{E49F6CDD-3D96-4E59-90E6-D27F0B55FBA1}" type="datetime1">
               <a:rPr lang="en-GB" noProof="0" smtClean="0"/>
-              <a:t>11/02/2021</a:t>
+              <a:t>12/02/2021</a:t>
             </a:fld>
             <a:endParaRPr lang="en-GB" noProof="0"/>
           </a:p>
@@ -1410,7 +1410,7 @@
           <a:p>
             <a:fld id="{CF43835C-B417-41EC-B18F-FE0259E07427}" type="datetime1">
               <a:rPr lang="en-GB" noProof="0" smtClean="0"/>
-              <a:t>11/02/2021</a:t>
+              <a:t>12/02/2021</a:t>
             </a:fld>
             <a:endParaRPr lang="en-GB" noProof="0"/>
           </a:p>
@@ -1808,7 +1808,7 @@
           <a:p>
             <a:fld id="{2AA00BC7-E6BD-409E-AC0A-D889FBBF3E1F}" type="datetime1">
               <a:rPr lang="en-GB" noProof="0" smtClean="0"/>
-              <a:t>11/02/2021</a:t>
+              <a:t>12/02/2021</a:t>
             </a:fld>
             <a:endParaRPr lang="en-GB" noProof="0"/>
           </a:p>
@@ -2007,7 +2007,7 @@
           <a:p>
             <a:fld id="{79F7EF30-58D9-49C5-94D1-8B67946A371B}" type="datetime1">
               <a:rPr lang="en-GB" noProof="0" smtClean="0"/>
-              <a:t>11/02/2021</a:t>
+              <a:t>12/02/2021</a:t>
             </a:fld>
             <a:endParaRPr lang="en-GB" noProof="0"/>
           </a:p>
@@ -2370,7 +2370,7 @@
           <a:p>
             <a:fld id="{9A4C26E0-BC88-47C0-AD7A-A430FED46C56}" type="datetime1">
               <a:rPr lang="en-GB" noProof="0" smtClean="0"/>
-              <a:t>11/02/2021</a:t>
+              <a:t>12/02/2021</a:t>
             </a:fld>
             <a:endParaRPr lang="en-GB" noProof="0"/>
           </a:p>
@@ -2861,7 +2861,7 @@
           <a:p>
             <a:fld id="{F4E85C38-12AF-4A65-9090-146927E09118}" type="datetime1">
               <a:rPr lang="en-GB" noProof="0" smtClean="0"/>
-              <a:t>11/02/2021</a:t>
+              <a:t>12/02/2021</a:t>
             </a:fld>
             <a:endParaRPr lang="en-GB" noProof="0"/>
           </a:p>
@@ -3086,7 +3086,7 @@
           <a:p>
             <a:fld id="{2AD8DA1C-8DF2-40CF-A6C6-9495D045055C}" type="datetime1">
               <a:rPr lang="en-GB" noProof="0" smtClean="0"/>
-              <a:t>11/02/2021</a:t>
+              <a:t>12/02/2021</a:t>
             </a:fld>
             <a:endParaRPr lang="en-GB" noProof="0"/>
           </a:p>
@@ -3491,7 +3491,7 @@
           <a:p>
             <a:fld id="{FA1142E9-37CE-4F05-A30E-024093FAE7FE}" type="datetime1">
               <a:rPr lang="en-GB" noProof="0" smtClean="0"/>
-              <a:t>11/02/2021</a:t>
+              <a:t>12/02/2021</a:t>
             </a:fld>
             <a:endParaRPr lang="en-GB" noProof="0"/>
           </a:p>
@@ -3716,7 +3716,7 @@
           <a:p>
             <a:fld id="{BA4F5F4A-6670-4A3D-BA5D-CF8F09F6A2E1}" type="datetime1">
               <a:rPr lang="en-GB" noProof="0" smtClean="0"/>
-              <a:t>11/02/2021</a:t>
+              <a:t>12/02/2021</a:t>
             </a:fld>
             <a:endParaRPr lang="en-GB" noProof="0"/>
           </a:p>
@@ -4103,7 +4103,7 @@
           <a:p>
             <a:fld id="{FA6CB48B-6017-439D-AA22-D52A1E8E03DF}" type="datetime1">
               <a:rPr lang="en-GB" noProof="0" smtClean="0"/>
-              <a:t>11/02/2021</a:t>
+              <a:t>12/02/2021</a:t>
             </a:fld>
             <a:endParaRPr lang="en-GB" noProof="0"/>
           </a:p>
@@ -4499,7 +4499,7 @@
           <a:p>
             <a:fld id="{43E7B4C2-9CD6-4CF3-963A-B0F7A6D52886}" type="datetime1">
               <a:rPr lang="en-GB" noProof="0" smtClean="0"/>
-              <a:t>11/02/2021</a:t>
+              <a:t>12/02/2021</a:t>
             </a:fld>
             <a:endParaRPr lang="en-GB" noProof="0"/>
           </a:p>
@@ -4807,7 +4807,7 @@
           <a:p>
             <a:fld id="{1EE6AC87-9CEE-4DB8-8548-B22705DD2657}" type="datetime1">
               <a:rPr lang="en-GB" noProof="0" smtClean="0"/>
-              <a:t>11/02/2021</a:t>
+              <a:t>12/02/2021</a:t>
             </a:fld>
             <a:endParaRPr lang="en-GB" noProof="0"/>
           </a:p>
@@ -5263,7 +5263,7 @@
           <a:p>
             <a:fld id="{9D03F41F-2DF9-4314-B419-CB3131364AA1}" type="datetime1">
               <a:rPr lang="en-GB" noProof="0" smtClean="0"/>
-              <a:t>11/02/2021</a:t>
+              <a:t>12/02/2021</a:t>
             </a:fld>
             <a:endParaRPr lang="en-GB" noProof="0"/>
           </a:p>
@@ -5537,7 +5537,7 @@
           <a:p>
             <a:fld id="{A586C00E-9402-4F7D-8E29-ACD9F4C25B61}" type="datetime1">
               <a:rPr lang="en-GB" noProof="0" smtClean="0"/>
-              <a:t>11/02/2021</a:t>
+              <a:t>12/02/2021</a:t>
             </a:fld>
             <a:endParaRPr lang="en-GB" noProof="0"/>
           </a:p>
@@ -5947,7 +5947,7 @@
           <a:p>
             <a:fld id="{DD093AD3-EDC3-4310-A3F5-847AF7FE82B9}" type="datetime1">
               <a:rPr lang="en-GB" noProof="0" smtClean="0"/>
-              <a:t>11/02/2021</a:t>
+              <a:t>12/02/2021</a:t>
             </a:fld>
             <a:endParaRPr lang="en-GB" noProof="0"/>
           </a:p>
@@ -6264,7 +6264,7 @@
           <a:p>
             <a:fld id="{1AFFCF40-801B-4055-982B-AEEA190E0F59}" type="datetime1">
               <a:rPr lang="en-GB" noProof="0" smtClean="0"/>
-              <a:t>11/02/2021</a:t>
+              <a:t>12/02/2021</a:t>
             </a:fld>
             <a:endParaRPr lang="en-GB" noProof="0"/>
           </a:p>
@@ -6717,7 +6717,7 @@
           <a:p>
             <a:fld id="{99D4FE21-5C27-4278-912B-A716F3E94A20}" type="datetime1">
               <a:rPr lang="en-GB" noProof="0" smtClean="0"/>
-              <a:t>11/02/2021</a:t>
+              <a:t>12/02/2021</a:t>
             </a:fld>
             <a:endParaRPr lang="en-GB" noProof="0"/>
           </a:p>
@@ -7471,7 +7471,7 @@
           <a:p>
             <a:fld id="{64EDD59F-3A17-4BC6-9E83-53686DFA9C26}" type="datetime1">
               <a:rPr lang="en-GB" noProof="0" smtClean="0"/>
-              <a:t>11/02/2021</a:t>
+              <a:t>12/02/2021</a:t>
             </a:fld>
             <a:endParaRPr lang="en-GB" noProof="0"/>
           </a:p>
@@ -8100,7 +8100,7 @@
           <a:p>
             <a:fld id="{C03CCED2-7CB5-4D58-8E64-3F32DD8AC35B}" type="datetime1">
               <a:rPr lang="en-GB" noProof="0" smtClean="0"/>
-              <a:t>11/02/2021</a:t>
+              <a:t>12/02/2021</a:t>
             </a:fld>
             <a:endParaRPr lang="en-GB" noProof="0"/>
           </a:p>
@@ -8385,7 +8385,7 @@
           <a:p>
             <a:fld id="{05B95343-439D-47C2-AB7D-A7B7FEDBEAB3}" type="datetime1">
               <a:rPr lang="en-GB" noProof="0" smtClean="0"/>
-              <a:t>11/02/2021</a:t>
+              <a:t>12/02/2021</a:t>
             </a:fld>
             <a:endParaRPr lang="en-GB" noProof="0"/>
           </a:p>
@@ -8712,7 +8712,7 @@
           <a:p>
             <a:fld id="{DFF24113-B408-42F9-B448-C515AD4E1B6E}" type="datetime1">
               <a:rPr lang="en-GB" noProof="0" smtClean="0"/>
-              <a:t>11/02/2021</a:t>
+              <a:t>12/02/2021</a:t>
             </a:fld>
             <a:endParaRPr lang="en-GB" noProof="0"/>
           </a:p>
@@ -9095,7 +9095,7 @@
           <a:p>
             <a:fld id="{E469B13D-3954-4F23-A09B-162115E21D05}" type="datetime1">
               <a:rPr lang="en-GB" noProof="0" smtClean="0"/>
-              <a:t>11/02/2021</a:t>
+              <a:t>12/02/2021</a:t>
             </a:fld>
             <a:endParaRPr lang="en-GB" noProof="0"/>
           </a:p>
@@ -9808,7 +9808,7 @@
           <a:p>
             <a:fld id="{FE98C067-8722-48C5-8452-DDEDD7114E73}" type="datetime1">
               <a:rPr lang="en-GB" noProof="0" smtClean="0"/>
-              <a:t>11/02/2021</a:t>
+              <a:t>12/02/2021</a:t>
             </a:fld>
             <a:endParaRPr lang="en-GB" noProof="0" dirty="0"/>
           </a:p>
@@ -10022,7 +10022,7 @@
           <a:p>
             <a:fld id="{6FA188AA-A794-4652-BE5A-909F08B6167B}" type="datetime1">
               <a:rPr lang="en-GB" noProof="0" smtClean="0"/>
-              <a:t>11/02/2021</a:t>
+              <a:t>12/02/2021</a:t>
             </a:fld>
             <a:endParaRPr lang="en-GB" noProof="0"/>
           </a:p>
@@ -10551,7 +10551,7 @@
           <a:p>
             <a:fld id="{19B791B1-16A9-4796-ABE1-3107E5C870A1}" type="datetime1">
               <a:rPr lang="en-GB" noProof="0" smtClean="0"/>
-              <a:t>11/02/2021</a:t>
+              <a:t>12/02/2021</a:t>
             </a:fld>
             <a:endParaRPr lang="en-GB" noProof="0"/>
           </a:p>
@@ -10913,7 +10913,7 @@
           <a:p>
             <a:fld id="{077F78B7-30BA-47DC-8D3D-B6AF7AA5C106}" type="datetime1">
               <a:rPr lang="en-GB" noProof="0" smtClean="0"/>
-              <a:t>11/02/2021</a:t>
+              <a:t>12/02/2021</a:t>
             </a:fld>
             <a:endParaRPr lang="en-GB" noProof="0"/>
           </a:p>
@@ -11238,7 +11238,7 @@
           <a:p>
             <a:fld id="{7A384A62-AD18-48D9-B88A-A3C8BA3326D3}" type="datetime1">
               <a:rPr lang="en-GB" noProof="0" smtClean="0"/>
-              <a:t>11/02/2021</a:t>
+              <a:t>12/02/2021</a:t>
             </a:fld>
             <a:endParaRPr lang="en-GB" noProof="0"/>
           </a:p>
@@ -11693,7 +11693,7 @@
           <a:p>
             <a:fld id="{B93D2B77-21B4-4503-8F96-67D29A8E98C1}" type="datetime1">
               <a:rPr lang="en-GB" noProof="0" smtClean="0"/>
-              <a:t>11/02/2021</a:t>
+              <a:t>12/02/2021</a:t>
             </a:fld>
             <a:endParaRPr lang="en-GB" noProof="0"/>
           </a:p>
@@ -12180,7 +12180,7 @@
           <a:p>
             <a:fld id="{7B41531B-607C-47F8-B3A9-9457FE35A658}" type="datetime1">
               <a:rPr lang="en-GB" noProof="0" smtClean="0"/>
-              <a:t>11/02/2021</a:t>
+              <a:t>12/02/2021</a:t>
             </a:fld>
             <a:endParaRPr lang="en-GB" noProof="0"/>
           </a:p>
@@ -12783,7 +12783,7 @@
           <a:p>
             <a:fld id="{2B82FCDA-E02D-49C5-97D6-3E67AC7AAA7E}" type="datetime1">
               <a:rPr lang="en-GB" noProof="0" smtClean="0"/>
-              <a:t>11/02/2021</a:t>
+              <a:t>12/02/2021</a:t>
             </a:fld>
             <a:endParaRPr lang="en-GB" noProof="0"/>
           </a:p>
@@ -12980,7 +12980,7 @@
           <a:p>
             <a:fld id="{78524CAB-73A3-4E1C-B819-63001E3C8AC4}" type="datetime1">
               <a:rPr lang="en-GB" noProof="0" smtClean="0"/>
-              <a:t>11/02/2021</a:t>
+              <a:t>12/02/2021</a:t>
             </a:fld>
             <a:endParaRPr lang="en-GB" noProof="0"/>
           </a:p>
@@ -14638,7 +14638,19 @@
               <a:rPr lang="tr-TR" dirty="0">
                 <a:latin typeface="NimbusSanL-Regu"/>
               </a:rPr>
-              <a:t>The objectives of the basic goal are as follows:</a:t>
+              <a:t>The objectives of the </a:t>
+            </a:r>
+            <a:r>
+              <a:rPr lang="fi-FI" dirty="0" err="1">
+                <a:latin typeface="NimbusSanL-Regu"/>
+              </a:rPr>
+              <a:t>advanced</a:t>
+            </a:r>
+            <a:r>
+              <a:rPr lang="tr-TR" dirty="0">
+                <a:latin typeface="NimbusSanL-Regu"/>
+              </a:rPr>
+              <a:t> goal are as follows:</a:t>
             </a:r>
             <a:endParaRPr lang="fi-FI" dirty="0">
               <a:latin typeface="NimbusSanL-Regu"/>
@@ -18692,8 +18704,13 @@
             <a:pPr lvl="2"/>
             <a:r>
               <a:rPr lang="en-GB" dirty="0"/>
-              <a:t>Developing a set of Python scripts for applying object detection (and possibly object tracking) for the video data frames 4 </a:t>
-            </a:r>
+              <a:t>Developing a set of Python scripts for applying object detection (and possibly object tracking) for the video data </a:t>
+            </a:r>
+            <a:r>
+              <a:rPr lang="en-GB"/>
+              <a:t>frames </a:t>
+            </a:r>
+            <a:endParaRPr lang="en-GB" dirty="0"/>
           </a:p>
           <a:p>
             <a:pPr lvl="2"/>

</xml_diff>